<commit_message>
modif animation sur prix
</commit_message>
<xml_diff>
--- a/présentation du p3.pptx
+++ b/présentation du p3.pptx
@@ -736,7 +736,7 @@
             <a:fld id="{5C446A46-76D0-4804-BAC8-FA19AC431DE6}" type="datetimeFigureOut">
               <a:rPr lang="fr-FR" smtClean="0"/>
               <a:pPr/>
-              <a:t>24/02/2022</a:t>
+              <a:t>24/03/2022</a:t>
             </a:fld>
             <a:endParaRPr lang="fr-FR"/>
           </a:p>
@@ -934,7 +934,7 @@
             <a:fld id="{5C446A46-76D0-4804-BAC8-FA19AC431DE6}" type="datetimeFigureOut">
               <a:rPr lang="fr-FR" smtClean="0"/>
               <a:pPr/>
-              <a:t>24/02/2022</a:t>
+              <a:t>24/03/2022</a:t>
             </a:fld>
             <a:endParaRPr lang="fr-FR"/>
           </a:p>
@@ -1121,7 +1121,7 @@
             <a:fld id="{5C446A46-76D0-4804-BAC8-FA19AC431DE6}" type="datetimeFigureOut">
               <a:rPr lang="fr-FR" smtClean="0"/>
               <a:pPr/>
-              <a:t>24/02/2022</a:t>
+              <a:t>24/03/2022</a:t>
             </a:fld>
             <a:endParaRPr lang="fr-FR"/>
           </a:p>
@@ -1273,7 +1273,7 @@
             <a:fld id="{5C446A46-76D0-4804-BAC8-FA19AC431DE6}" type="datetimeFigureOut">
               <a:rPr lang="fr-FR" smtClean="0"/>
               <a:pPr/>
-              <a:t>24/02/2022</a:t>
+              <a:t>24/03/2022</a:t>
             </a:fld>
             <a:endParaRPr lang="fr-FR"/>
           </a:p>
@@ -1530,7 +1530,7 @@
             <a:fld id="{5C446A46-76D0-4804-BAC8-FA19AC431DE6}" type="datetimeFigureOut">
               <a:rPr lang="fr-FR" smtClean="0"/>
               <a:pPr/>
-              <a:t>24/02/2022</a:t>
+              <a:t>24/03/2022</a:t>
             </a:fld>
             <a:endParaRPr lang="fr-FR"/>
           </a:p>
@@ -1941,7 +1941,7 @@
             <a:fld id="{5C446A46-76D0-4804-BAC8-FA19AC431DE6}" type="datetimeFigureOut">
               <a:rPr lang="fr-FR" smtClean="0"/>
               <a:pPr/>
-              <a:t>24/02/2022</a:t>
+              <a:t>24/03/2022</a:t>
             </a:fld>
             <a:endParaRPr lang="fr-FR"/>
           </a:p>
@@ -2389,7 +2389,7 @@
             <a:fld id="{5C446A46-76D0-4804-BAC8-FA19AC431DE6}" type="datetimeFigureOut">
               <a:rPr lang="fr-FR" smtClean="0"/>
               <a:pPr/>
-              <a:t>24/02/2022</a:t>
+              <a:t>24/03/2022</a:t>
             </a:fld>
             <a:endParaRPr lang="fr-FR"/>
           </a:p>
@@ -2492,7 +2492,7 @@
             <a:fld id="{5C446A46-76D0-4804-BAC8-FA19AC431DE6}" type="datetimeFigureOut">
               <a:rPr lang="fr-FR" smtClean="0"/>
               <a:pPr/>
-              <a:t>24/02/2022</a:t>
+              <a:t>24/03/2022</a:t>
             </a:fld>
             <a:endParaRPr lang="fr-FR"/>
           </a:p>
@@ -2615,7 +2615,7 @@
             <a:fld id="{5C446A46-76D0-4804-BAC8-FA19AC431DE6}" type="datetimeFigureOut">
               <a:rPr lang="fr-FR" smtClean="0"/>
               <a:pPr/>
-              <a:t>24/02/2022</a:t>
+              <a:t>24/03/2022</a:t>
             </a:fld>
             <a:endParaRPr lang="fr-FR"/>
           </a:p>
@@ -2891,7 +2891,7 @@
             <a:fld id="{5C446A46-76D0-4804-BAC8-FA19AC431DE6}" type="datetimeFigureOut">
               <a:rPr lang="fr-FR" smtClean="0"/>
               <a:pPr/>
-              <a:t>24/02/2022</a:t>
+              <a:t>24/03/2022</a:t>
             </a:fld>
             <a:endParaRPr lang="fr-FR"/>
           </a:p>
@@ -3098,7 +3098,7 @@
             <a:fld id="{5C446A46-76D0-4804-BAC8-FA19AC431DE6}" type="datetimeFigureOut">
               <a:rPr lang="fr-FR" smtClean="0"/>
               <a:pPr/>
-              <a:t>24/02/2022</a:t>
+              <a:t>24/03/2022</a:t>
             </a:fld>
             <a:endParaRPr lang="fr-FR"/>
           </a:p>
@@ -4209,7 +4209,7 @@
             <a:fld id="{5C446A46-76D0-4804-BAC8-FA19AC431DE6}" type="datetimeFigureOut">
               <a:rPr lang="fr-FR" smtClean="0"/>
               <a:pPr/>
-              <a:t>24/02/2022</a:t>
+              <a:t>24/03/2022</a:t>
             </a:fld>
             <a:endParaRPr lang="fr-FR"/>
           </a:p>
@@ -4847,11 +4847,7 @@
           <a:p>
             <a:r>
               <a:rPr lang="fr-FR" sz="800" dirty="0" smtClean="0"/>
-              <a:t> </a:t>
-            </a:r>
-            <a:r>
-              <a:rPr lang="fr-FR" sz="800" dirty="0" smtClean="0"/>
-              <a:t>.</a:t>
+              <a:t> .</a:t>
             </a:r>
             <a:r>
               <a:rPr lang="en-US" sz="800" dirty="0" smtClean="0"/>
@@ -4868,15 +4864,7 @@
           <a:p>
             <a:r>
               <a:rPr lang="fr-FR" sz="800" dirty="0" smtClean="0"/>
-              <a:t> </a:t>
-            </a:r>
-            <a:r>
-              <a:rPr lang="fr-FR" sz="800" dirty="0" smtClean="0"/>
-              <a:t>        ├ </a:t>
-            </a:r>
-            <a:r>
-              <a:rPr lang="fr-FR" sz="800" dirty="0" smtClean="0"/>
-              <a:t>&amp;</a:t>
+              <a:t>         ├ &amp;</a:t>
             </a:r>
             <a:r>
               <a:rPr lang="en-US" sz="800" dirty="0" smtClean="0"/>
@@ -4891,37 +4879,13 @@
           <a:p>
             <a:r>
               <a:rPr lang="fr-FR" sz="800" dirty="0" smtClean="0"/>
-              <a:t> </a:t>
-            </a:r>
-            <a:r>
-              <a:rPr lang="fr-FR" sz="800" dirty="0" smtClean="0"/>
-              <a:t>       </a:t>
-            </a:r>
-            <a:r>
-              <a:rPr lang="fr-FR" sz="800" dirty="0" smtClean="0"/>
-              <a:t> </a:t>
-            </a:r>
-            <a:r>
-              <a:rPr lang="fr-FR" sz="800" dirty="0" smtClean="0"/>
-              <a:t>│</a:t>
-            </a:r>
-            <a:r>
-              <a:rPr lang="fr-FR" sz="800" dirty="0" smtClean="0"/>
-              <a:t> </a:t>
-            </a:r>
-            <a:r>
-              <a:rPr lang="fr-FR" sz="800" dirty="0" smtClean="0"/>
-              <a:t>         │</a:t>
-            </a:r>
-          </a:p>
-          <a:p>
-            <a:r>
-              <a:rPr lang="fr-FR" sz="800" dirty="0" smtClean="0"/>
-              <a:t>         │          └</a:t>
-            </a:r>
-            <a:r>
-              <a:rPr lang="fr-FR" sz="800" dirty="0" smtClean="0"/>
-              <a:t>  &amp;:</a:t>
+              <a:t>         │          │</a:t>
+            </a:r>
+          </a:p>
+          <a:p>
+            <a:r>
+              <a:rPr lang="fr-FR" sz="800" dirty="0" smtClean="0"/>
+              <a:t>         │          └  &amp;:</a:t>
             </a:r>
             <a:r>
               <a:rPr lang="fr-FR" sz="800" smtClean="0"/>
@@ -4934,16 +4898,11 @@
               <a:rPr lang="fr-FR" sz="800" dirty="0" smtClean="0"/>
               <a:t>         │</a:t>
             </a:r>
-            <a:endParaRPr lang="fr-FR" sz="800" dirty="0" smtClean="0"/>
-          </a:p>
-          <a:p>
-            <a:r>
-              <a:rPr lang="fr-FR" sz="800" dirty="0" smtClean="0"/>
-              <a:t>        </a:t>
-            </a:r>
-            <a:r>
-              <a:rPr lang="fr-FR" sz="800" dirty="0" smtClean="0"/>
-              <a:t> └</a:t>
+          </a:p>
+          <a:p>
+            <a:r>
+              <a:rPr lang="fr-FR" sz="800" dirty="0" smtClean="0"/>
+              <a:t>         └</a:t>
             </a:r>
             <a:r>
               <a:rPr lang="fr-FR" sz="800" dirty="0" err="1" smtClean="0"/>
@@ -5320,11 +5279,15 @@
             </a:r>
             <a:r>
               <a:rPr lang="fr-FR" sz="800" dirty="0" smtClean="0"/>
-              <a:t>        └ &amp;</a:t>
+              <a:t>        └ </a:t>
+            </a:r>
+            <a:r>
+              <a:rPr lang="fr-FR" sz="800" dirty="0" smtClean="0"/>
+              <a:t>&amp;</a:t>
             </a:r>
             <a:r>
               <a:rPr lang="fr-FR" sz="800" dirty="0" err="1" smtClean="0"/>
-              <a:t>__div</a:t>
+              <a:t>__conteneur</a:t>
             </a:r>
             <a:endParaRPr lang="fr-FR" sz="800" dirty="0" smtClean="0"/>
           </a:p>
@@ -5353,11 +5316,7 @@
           <a:p>
             <a:r>
               <a:rPr lang="fr-FR" sz="800" dirty="0" smtClean="0"/>
-              <a:t>                </a:t>
-            </a:r>
-            <a:r>
-              <a:rPr lang="fr-FR" sz="800" dirty="0" smtClean="0"/>
-              <a:t>├ </a:t>
+              <a:t>                ├ </a:t>
             </a:r>
             <a:r>
               <a:rPr lang="fr-FR" sz="800" dirty="0" err="1" smtClean="0"/>
@@ -5722,8 +5681,8 @@
               <a:t>      ├ </a:t>
             </a:r>
             <a:r>
-              <a:rPr lang="fr-FR" sz="800" dirty="0" err="1" smtClean="0"/>
-              <a:t>div</a:t>
+              <a:rPr lang="fr-FR" sz="800" dirty="0" smtClean="0"/>
+              <a:t>conteneur</a:t>
             </a:r>
             <a:endParaRPr lang="fr-FR" sz="800" dirty="0" smtClean="0"/>
           </a:p>
@@ -6011,11 +5970,7 @@
             <a:pPr algn="ctr"/>
             <a:r>
               <a:rPr lang="fr-FR" dirty="0" smtClean="0"/>
-              <a:t>Page des </a:t>
-            </a:r>
-            <a:r>
-              <a:rPr lang="fr-FR" dirty="0" smtClean="0"/>
-              <a:t>restaurants</a:t>
+              <a:t>Page des restaurants</a:t>
             </a:r>
             <a:endParaRPr lang="fr-FR" dirty="0"/>
           </a:p>

</xml_diff>

<commit_message>
modif adresse lien adobe XD
</commit_message>
<xml_diff>
--- a/présentation du p3.pptx
+++ b/présentation du p3.pptx
@@ -6769,7 +6769,7 @@
           <a:p>
             <a:pPr lvl="1"/>
             <a:r>
-              <a:rPr lang="fr-FR" sz="1200" dirty="0" smtClean="0">
+              <a:rPr lang="fr-FR" sz="1200" smtClean="0">
                 <a:hlinkClick r:id="rId2"/>
               </a:rPr>
               <a:t>https</a:t>
@@ -6784,7 +6784,7 @@
               <a:rPr lang="fr-FR" sz="1200" smtClean="0">
                 <a:hlinkClick r:id="rId2"/>
               </a:rPr>
-              <a:t>xd.adobe.com/view/7e8a14be-37be-4a5c-a9c6-4c89e4239e44-2bd9/screen/d8e09926-0c19-4669-ac35-6cb3dd332c93?fullscreen&amp;hints=off</a:t>
+              <a:t>xd.adobe.com/view/d28976e4-f0d8-4cb5-b8dc-6abdf38f42c9-87da/screen/d8e09926-0c19-4669-ac35-6cb3dd332c93?fullscreen&amp;hints=off</a:t>
             </a:r>
             <a:r>
               <a:rPr lang="fr-FR" sz="1200" smtClean="0"/>

</xml_diff>

<commit_message>
supression animation sur text loading
</commit_message>
<xml_diff>
--- a/présentation du p3.pptx
+++ b/présentation du p3.pptx
@@ -746,7 +746,7 @@
             <a:fld id="{5C446A46-76D0-4804-BAC8-FA19AC431DE6}" type="datetimeFigureOut">
               <a:rPr lang="fr-FR" smtClean="0"/>
               <a:pPr/>
-              <a:t>03/04/2022</a:t>
+              <a:t>05/04/2022</a:t>
             </a:fld>
             <a:endParaRPr lang="fr-FR"/>
           </a:p>
@@ -944,7 +944,7 @@
             <a:fld id="{5C446A46-76D0-4804-BAC8-FA19AC431DE6}" type="datetimeFigureOut">
               <a:rPr lang="fr-FR" smtClean="0"/>
               <a:pPr/>
-              <a:t>03/04/2022</a:t>
+              <a:t>05/04/2022</a:t>
             </a:fld>
             <a:endParaRPr lang="fr-FR"/>
           </a:p>
@@ -1131,7 +1131,7 @@
             <a:fld id="{5C446A46-76D0-4804-BAC8-FA19AC431DE6}" type="datetimeFigureOut">
               <a:rPr lang="fr-FR" smtClean="0"/>
               <a:pPr/>
-              <a:t>03/04/2022</a:t>
+              <a:t>05/04/2022</a:t>
             </a:fld>
             <a:endParaRPr lang="fr-FR"/>
           </a:p>
@@ -1283,7 +1283,7 @@
             <a:fld id="{5C446A46-76D0-4804-BAC8-FA19AC431DE6}" type="datetimeFigureOut">
               <a:rPr lang="fr-FR" smtClean="0"/>
               <a:pPr/>
-              <a:t>03/04/2022</a:t>
+              <a:t>05/04/2022</a:t>
             </a:fld>
             <a:endParaRPr lang="fr-FR"/>
           </a:p>
@@ -1540,7 +1540,7 @@
             <a:fld id="{5C446A46-76D0-4804-BAC8-FA19AC431DE6}" type="datetimeFigureOut">
               <a:rPr lang="fr-FR" smtClean="0"/>
               <a:pPr/>
-              <a:t>03/04/2022</a:t>
+              <a:t>05/04/2022</a:t>
             </a:fld>
             <a:endParaRPr lang="fr-FR"/>
           </a:p>
@@ -1951,7 +1951,7 @@
             <a:fld id="{5C446A46-76D0-4804-BAC8-FA19AC431DE6}" type="datetimeFigureOut">
               <a:rPr lang="fr-FR" smtClean="0"/>
               <a:pPr/>
-              <a:t>03/04/2022</a:t>
+              <a:t>05/04/2022</a:t>
             </a:fld>
             <a:endParaRPr lang="fr-FR"/>
           </a:p>
@@ -2399,7 +2399,7 @@
             <a:fld id="{5C446A46-76D0-4804-BAC8-FA19AC431DE6}" type="datetimeFigureOut">
               <a:rPr lang="fr-FR" smtClean="0"/>
               <a:pPr/>
-              <a:t>03/04/2022</a:t>
+              <a:t>05/04/2022</a:t>
             </a:fld>
             <a:endParaRPr lang="fr-FR"/>
           </a:p>
@@ -2502,7 +2502,7 @@
             <a:fld id="{5C446A46-76D0-4804-BAC8-FA19AC431DE6}" type="datetimeFigureOut">
               <a:rPr lang="fr-FR" smtClean="0"/>
               <a:pPr/>
-              <a:t>03/04/2022</a:t>
+              <a:t>05/04/2022</a:t>
             </a:fld>
             <a:endParaRPr lang="fr-FR"/>
           </a:p>
@@ -2625,7 +2625,7 @@
             <a:fld id="{5C446A46-76D0-4804-BAC8-FA19AC431DE6}" type="datetimeFigureOut">
               <a:rPr lang="fr-FR" smtClean="0"/>
               <a:pPr/>
-              <a:t>03/04/2022</a:t>
+              <a:t>05/04/2022</a:t>
             </a:fld>
             <a:endParaRPr lang="fr-FR"/>
           </a:p>
@@ -2901,7 +2901,7 @@
             <a:fld id="{5C446A46-76D0-4804-BAC8-FA19AC431DE6}" type="datetimeFigureOut">
               <a:rPr lang="fr-FR" smtClean="0"/>
               <a:pPr/>
-              <a:t>03/04/2022</a:t>
+              <a:t>05/04/2022</a:t>
             </a:fld>
             <a:endParaRPr lang="fr-FR"/>
           </a:p>
@@ -3108,7 +3108,7 @@
             <a:fld id="{5C446A46-76D0-4804-BAC8-FA19AC431DE6}" type="datetimeFigureOut">
               <a:rPr lang="fr-FR" smtClean="0"/>
               <a:pPr/>
-              <a:t>03/04/2022</a:t>
+              <a:t>05/04/2022</a:t>
             </a:fld>
             <a:endParaRPr lang="fr-FR"/>
           </a:p>
@@ -4219,7 +4219,7 @@
             <a:fld id="{5C446A46-76D0-4804-BAC8-FA19AC431DE6}" type="datetimeFigureOut">
               <a:rPr lang="fr-FR" smtClean="0"/>
               <a:pPr/>
-              <a:t>03/04/2022</a:t>
+              <a:t>05/04/2022</a:t>
             </a:fld>
             <a:endParaRPr lang="fr-FR"/>
           </a:p>
@@ -6772,19 +6772,7 @@
               <a:rPr lang="fr-FR" sz="1200" smtClean="0">
                 <a:hlinkClick r:id="rId2"/>
               </a:rPr>
-              <a:t>https</a:t>
-            </a:r>
-            <a:r>
-              <a:rPr lang="fr-FR" sz="1200" smtClean="0">
-                <a:hlinkClick r:id="rId2"/>
-              </a:rPr>
-              <a:t>://</a:t>
-            </a:r>
-            <a:r>
-              <a:rPr lang="fr-FR" sz="1200" smtClean="0">
-                <a:hlinkClick r:id="rId2"/>
-              </a:rPr>
-              <a:t>xd.adobe.com/view/d28976e4-f0d8-4cb5-b8dc-6abdf38f42c9-87da/screen/d8e09926-0c19-4669-ac35-6cb3dd332c93?fullscreen&amp;hints=off</a:t>
+              <a:t>https://xd.adobe.com/view/d28976e4-f0d8-4cb5-b8dc-6abdf38f42c9-87da/screen/d8e09926-0c19-4669-ac35-6cb3dd332c93?fullscreen&amp;hints=off</a:t>
             </a:r>
             <a:r>
               <a:rPr lang="fr-FR" sz="1200" smtClean="0"/>
@@ -7905,7 +7893,7 @@
         <p:spPr/>
         <p:txBody>
           <a:bodyPr>
-            <a:normAutofit lnSpcReduction="10000"/>
+            <a:normAutofit/>
           </a:bodyPr>
           <a:lstStyle/>
           <a:p>
@@ -7965,41 +7953,17 @@
             </a:r>
             <a:r>
               <a:rPr lang="fr-FR" sz="1600" dirty="0" smtClean="0"/>
-              <a:t> son vide.</a:t>
-            </a:r>
-          </a:p>
-          <a:p>
-            <a:pPr>
-              <a:buNone/>
-            </a:pPr>
-            <a:r>
-              <a:rPr lang="fr-FR" sz="1600" dirty="0" smtClean="0"/>
-              <a:t>	J’applique a mon </a:t>
-            </a:r>
-            <a:r>
-              <a:rPr lang="fr-FR" sz="1600" dirty="0" err="1" smtClean="0"/>
-              <a:t>span</a:t>
-            </a:r>
-            <a:r>
-              <a:rPr lang="fr-FR" sz="1600" dirty="0" smtClean="0"/>
-              <a:t> une couleur blanche et je fait une animation avec une </a:t>
-            </a:r>
-            <a:r>
-              <a:rPr lang="fr-FR" sz="1600" dirty="0" err="1" smtClean="0"/>
-              <a:t>keyframe</a:t>
-            </a:r>
-            <a:r>
-              <a:rPr lang="fr-FR" sz="1600" dirty="0" smtClean="0"/>
-              <a:t> « </a:t>
-            </a:r>
-            <a:r>
-              <a:rPr lang="fr-FR" sz="1600" dirty="0" err="1" smtClean="0"/>
-              <a:t>text</a:t>
-            </a:r>
-            <a:r>
-              <a:rPr lang="fr-FR" sz="1600" dirty="0" smtClean="0"/>
-              <a:t> »qui a 50% du temps de l’animation la fait passé a noir</a:t>
-            </a:r>
+              <a:t> son </a:t>
+            </a:r>
+            <a:r>
+              <a:rPr lang="fr-FR" sz="1600" smtClean="0"/>
+              <a:t>vide</a:t>
+            </a:r>
+            <a:r>
+              <a:rPr lang="fr-FR" sz="1600" smtClean="0"/>
+              <a:t>.</a:t>
+            </a:r>
+            <a:endParaRPr lang="fr-FR" sz="1600" dirty="0" smtClean="0"/>
           </a:p>
           <a:p>
             <a:r>

</xml_diff>

<commit_message>
modification apporter suite à section de soutenance ajout espace et translateY
</commit_message>
<xml_diff>
--- a/présentation du p3.pptx
+++ b/présentation du p3.pptx
@@ -746,7 +746,7 @@
             <a:fld id="{5C446A46-76D0-4804-BAC8-FA19AC431DE6}" type="datetimeFigureOut">
               <a:rPr lang="fr-FR" smtClean="0"/>
               <a:pPr/>
-              <a:t>05/04/2022</a:t>
+              <a:t>08/04/2022</a:t>
             </a:fld>
             <a:endParaRPr lang="fr-FR"/>
           </a:p>
@@ -944,7 +944,7 @@
             <a:fld id="{5C446A46-76D0-4804-BAC8-FA19AC431DE6}" type="datetimeFigureOut">
               <a:rPr lang="fr-FR" smtClean="0"/>
               <a:pPr/>
-              <a:t>05/04/2022</a:t>
+              <a:t>08/04/2022</a:t>
             </a:fld>
             <a:endParaRPr lang="fr-FR"/>
           </a:p>
@@ -1131,7 +1131,7 @@
             <a:fld id="{5C446A46-76D0-4804-BAC8-FA19AC431DE6}" type="datetimeFigureOut">
               <a:rPr lang="fr-FR" smtClean="0"/>
               <a:pPr/>
-              <a:t>05/04/2022</a:t>
+              <a:t>08/04/2022</a:t>
             </a:fld>
             <a:endParaRPr lang="fr-FR"/>
           </a:p>
@@ -1283,7 +1283,7 @@
             <a:fld id="{5C446A46-76D0-4804-BAC8-FA19AC431DE6}" type="datetimeFigureOut">
               <a:rPr lang="fr-FR" smtClean="0"/>
               <a:pPr/>
-              <a:t>05/04/2022</a:t>
+              <a:t>08/04/2022</a:t>
             </a:fld>
             <a:endParaRPr lang="fr-FR"/>
           </a:p>
@@ -1540,7 +1540,7 @@
             <a:fld id="{5C446A46-76D0-4804-BAC8-FA19AC431DE6}" type="datetimeFigureOut">
               <a:rPr lang="fr-FR" smtClean="0"/>
               <a:pPr/>
-              <a:t>05/04/2022</a:t>
+              <a:t>08/04/2022</a:t>
             </a:fld>
             <a:endParaRPr lang="fr-FR"/>
           </a:p>
@@ -1951,7 +1951,7 @@
             <a:fld id="{5C446A46-76D0-4804-BAC8-FA19AC431DE6}" type="datetimeFigureOut">
               <a:rPr lang="fr-FR" smtClean="0"/>
               <a:pPr/>
-              <a:t>05/04/2022</a:t>
+              <a:t>08/04/2022</a:t>
             </a:fld>
             <a:endParaRPr lang="fr-FR"/>
           </a:p>
@@ -2399,7 +2399,7 @@
             <a:fld id="{5C446A46-76D0-4804-BAC8-FA19AC431DE6}" type="datetimeFigureOut">
               <a:rPr lang="fr-FR" smtClean="0"/>
               <a:pPr/>
-              <a:t>05/04/2022</a:t>
+              <a:t>08/04/2022</a:t>
             </a:fld>
             <a:endParaRPr lang="fr-FR"/>
           </a:p>
@@ -2502,7 +2502,7 @@
             <a:fld id="{5C446A46-76D0-4804-BAC8-FA19AC431DE6}" type="datetimeFigureOut">
               <a:rPr lang="fr-FR" smtClean="0"/>
               <a:pPr/>
-              <a:t>05/04/2022</a:t>
+              <a:t>08/04/2022</a:t>
             </a:fld>
             <a:endParaRPr lang="fr-FR"/>
           </a:p>
@@ -2625,7 +2625,7 @@
             <a:fld id="{5C446A46-76D0-4804-BAC8-FA19AC431DE6}" type="datetimeFigureOut">
               <a:rPr lang="fr-FR" smtClean="0"/>
               <a:pPr/>
-              <a:t>05/04/2022</a:t>
+              <a:t>08/04/2022</a:t>
             </a:fld>
             <a:endParaRPr lang="fr-FR"/>
           </a:p>
@@ -2901,7 +2901,7 @@
             <a:fld id="{5C446A46-76D0-4804-BAC8-FA19AC431DE6}" type="datetimeFigureOut">
               <a:rPr lang="fr-FR" smtClean="0"/>
               <a:pPr/>
-              <a:t>05/04/2022</a:t>
+              <a:t>08/04/2022</a:t>
             </a:fld>
             <a:endParaRPr lang="fr-FR"/>
           </a:p>
@@ -3108,7 +3108,7 @@
             <a:fld id="{5C446A46-76D0-4804-BAC8-FA19AC431DE6}" type="datetimeFigureOut">
               <a:rPr lang="fr-FR" smtClean="0"/>
               <a:pPr/>
-              <a:t>05/04/2022</a:t>
+              <a:t>08/04/2022</a:t>
             </a:fld>
             <a:endParaRPr lang="fr-FR"/>
           </a:p>
@@ -4219,7 +4219,7 @@
             <a:fld id="{5C446A46-76D0-4804-BAC8-FA19AC431DE6}" type="datetimeFigureOut">
               <a:rPr lang="fr-FR" smtClean="0"/>
               <a:pPr/>
-              <a:t>05/04/2022</a:t>
+              <a:t>08/04/2022</a:t>
             </a:fld>
             <a:endParaRPr lang="fr-FR"/>
           </a:p>
@@ -6769,13 +6769,13 @@
           <a:p>
             <a:pPr lvl="1"/>
             <a:r>
-              <a:rPr lang="fr-FR" sz="1200" smtClean="0">
+              <a:rPr lang="fr-FR" sz="1200" dirty="0" smtClean="0">
                 <a:hlinkClick r:id="rId2"/>
               </a:rPr>
               <a:t>https://xd.adobe.com/view/d28976e4-f0d8-4cb5-b8dc-6abdf38f42c9-87da/screen/d8e09926-0c19-4669-ac35-6cb3dd332c93?fullscreen&amp;hints=off</a:t>
             </a:r>
             <a:r>
-              <a:rPr lang="fr-FR" sz="1200" smtClean="0"/>
+              <a:rPr lang="fr-FR" sz="1200" dirty="0" smtClean="0"/>
               <a:t> .</a:t>
             </a:r>
             <a:endParaRPr lang="fr-FR" sz="1200" dirty="0"/>
@@ -6913,7 +6913,47 @@
             </a:r>
             <a:r>
               <a:rPr lang="fr-FR" sz="1600" dirty="0" smtClean="0"/>
-              <a:t> réguliers pour suivre son avancement et publier le site en ligne plus facilement.</a:t>
+              <a:t> réguliers pour suivre son avancement et publier le site en ligne plus facilement.(en se qui concerne les </a:t>
+            </a:r>
+            <a:r>
+              <a:rPr lang="fr-FR" sz="1600" dirty="0" smtClean="0"/>
+              <a:t>deniers </a:t>
+            </a:r>
+            <a:r>
+              <a:rPr lang="fr-FR" sz="1600" dirty="0" smtClean="0"/>
+              <a:t>section de </a:t>
+            </a:r>
+            <a:r>
+              <a:rPr lang="fr-FR" sz="1600" dirty="0" err="1" smtClean="0"/>
+              <a:t>commits</a:t>
+            </a:r>
+            <a:r>
+              <a:rPr lang="fr-FR" sz="1600" dirty="0" smtClean="0"/>
+              <a:t> on peut les voire plus espacer car j’</a:t>
+            </a:r>
+            <a:r>
+              <a:rPr lang="fr-FR" sz="1600" dirty="0" err="1" smtClean="0"/>
+              <a:t>etais</a:t>
+            </a:r>
+            <a:r>
+              <a:rPr lang="fr-FR" sz="1600" dirty="0" smtClean="0"/>
+              <a:t> passer sur d’autre projet et je suis revenue </a:t>
+            </a:r>
+            <a:r>
+              <a:rPr lang="fr-FR" sz="1600" dirty="0" smtClean="0"/>
+              <a:t>dessue </a:t>
+            </a:r>
+            <a:r>
+              <a:rPr lang="fr-FR" sz="1600" dirty="0" smtClean="0"/>
+              <a:t>quand j’en </a:t>
+            </a:r>
+            <a:r>
+              <a:rPr lang="fr-FR" sz="1600" dirty="0" smtClean="0"/>
+              <a:t>étais à </a:t>
+            </a:r>
+            <a:r>
+              <a:rPr lang="fr-FR" sz="1600" dirty="0" smtClean="0"/>
+              <a:t>se point avec mon mentor)</a:t>
             </a:r>
           </a:p>
           <a:p>
@@ -7953,17 +7993,8 @@
             </a:r>
             <a:r>
               <a:rPr lang="fr-FR" sz="1600" dirty="0" smtClean="0"/>
-              <a:t> son </a:t>
-            </a:r>
-            <a:r>
-              <a:rPr lang="fr-FR" sz="1600" smtClean="0"/>
-              <a:t>vide</a:t>
-            </a:r>
-            <a:r>
-              <a:rPr lang="fr-FR" sz="1600" smtClean="0"/>
-              <a:t>.</a:t>
-            </a:r>
-            <a:endParaRPr lang="fr-FR" sz="1600" dirty="0" smtClean="0"/>
+              <a:t> son vide.</a:t>
+            </a:r>
           </a:p>
           <a:p>
             <a:r>
@@ -8084,15 +8115,7 @@
           <a:p>
             <a:r>
               <a:rPr lang="fr-FR" sz="1600" dirty="0" smtClean="0"/>
-              <a:t>Je </a:t>
-            </a:r>
-            <a:r>
-              <a:rPr lang="fr-FR" sz="1600" dirty="0" err="1" smtClean="0"/>
-              <a:t>mesaussi</a:t>
-            </a:r>
-            <a:r>
-              <a:rPr lang="fr-FR" sz="1600" dirty="0" smtClean="0"/>
-              <a:t> une </a:t>
+              <a:t>Je mes aussi une </a:t>
             </a:r>
             <a:r>
               <a:rPr lang="fr-FR" sz="1600" dirty="0" err="1" smtClean="0"/>
@@ -8100,7 +8123,15 @@
             </a:r>
             <a:r>
               <a:rPr lang="fr-FR" sz="1600" dirty="0" smtClean="0"/>
-              <a:t> à sont animation à la quelle j’applique 3rotate avec des box </a:t>
+              <a:t> à sont animation à la quelle j’applique 3 </a:t>
+            </a:r>
+            <a:r>
+              <a:rPr lang="fr-FR" sz="1600" dirty="0" err="1" smtClean="0"/>
+              <a:t>rotate</a:t>
+            </a:r>
+            <a:r>
+              <a:rPr lang="fr-FR" sz="1600" dirty="0" smtClean="0"/>
+              <a:t> avec des box </a:t>
             </a:r>
             <a:r>
               <a:rPr lang="fr-FR" sz="1600" dirty="0" err="1" smtClean="0"/>

</xml_diff>